<commit_message>
Updated Jour Fixe 1
</commit_message>
<xml_diff>
--- a/docs/Jour Fixe 1.pptx
+++ b/docs/Jour Fixe 1.pptx
@@ -13,23 +13,24 @@
     <p:sldId id="258" r:id="rId8"/>
     <p:sldId id="259" r:id="rId9"/>
     <p:sldId id="260" r:id="rId10"/>
+    <p:sldId id="261" r:id="rId11"/>
   </p:sldIdLst>
   <p:sldSz cy="5143500" cx="9144000"/>
   <p:notesSz cx="6858000" cy="9144000"/>
   <p:embeddedFontLst>
     <p:embeddedFont>
       <p:font typeface="Roboto"/>
-      <p:regular r:id="rId11"/>
-      <p:bold r:id="rId12"/>
-      <p:italic r:id="rId13"/>
-      <p:boldItalic r:id="rId14"/>
+      <p:regular r:id="rId12"/>
+      <p:bold r:id="rId13"/>
+      <p:italic r:id="rId14"/>
+      <p:boldItalic r:id="rId15"/>
     </p:embeddedFont>
     <p:embeddedFont>
       <p:font typeface="Roboto Medium"/>
-      <p:regular r:id="rId15"/>
-      <p:bold r:id="rId16"/>
-      <p:italic r:id="rId17"/>
-      <p:boldItalic r:id="rId18"/>
+      <p:regular r:id="rId16"/>
+      <p:bold r:id="rId17"/>
+      <p:italic r:id="rId18"/>
+      <p:boldItalic r:id="rId19"/>
     </p:embeddedFont>
   </p:embeddedFontLst>
   <p:defaultTextStyle>
@@ -909,7 +910,7 @@
       </p:grpSpPr>
       <p:sp>
         <p:nvSpPr>
-          <p:cNvPr id="61" name="Google Shape;61;g22c5ea40572_0_107:notes"/>
+          <p:cNvPr id="61" name="Google Shape;61;g22c5ea40572_5_0:notes"/>
           <p:cNvSpPr/>
           <p:nvPr>
             <p:ph idx="2" type="sldImg"/>
@@ -944,7 +945,7 @@
       </p:sp>
       <p:sp>
         <p:nvSpPr>
-          <p:cNvPr id="62" name="Google Shape;62;g22c5ea40572_0_107:notes"/>
+          <p:cNvPr id="62" name="Google Shape;62;g22c5ea40572_5_0:notes"/>
           <p:cNvSpPr txBox="1"/>
           <p:nvPr>
             <p:ph idx="1" type="body"/>
@@ -994,7 +995,7 @@
   <p:cSld>
     <p:spTree>
       <p:nvGrpSpPr>
-        <p:cNvPr id="68" name="Shape 68"/>
+        <p:cNvPr id="69" name="Shape 69"/>
         <p:cNvGrpSpPr/>
         <p:nvPr/>
       </p:nvGrpSpPr>
@@ -1008,7 +1009,7 @@
       </p:grpSpPr>
       <p:sp>
         <p:nvSpPr>
-          <p:cNvPr id="69" name="Google Shape;69;g22c5ea40572_0_0:notes"/>
+          <p:cNvPr id="70" name="Google Shape;70;g22c5ea40572_0_107:notes"/>
           <p:cNvSpPr/>
           <p:nvPr>
             <p:ph idx="2" type="sldImg"/>
@@ -1043,7 +1044,7 @@
       </p:sp>
       <p:sp>
         <p:nvSpPr>
-          <p:cNvPr id="70" name="Google Shape;70;g22c5ea40572_0_0:notes"/>
+          <p:cNvPr id="71" name="Google Shape;71;g22c5ea40572_0_107:notes"/>
           <p:cNvSpPr txBox="1"/>
           <p:nvPr>
             <p:ph idx="1" type="body"/>
@@ -1093,7 +1094,7 @@
   <p:cSld>
     <p:spTree>
       <p:nvGrpSpPr>
-        <p:cNvPr id="91" name="Shape 91"/>
+        <p:cNvPr id="77" name="Shape 77"/>
         <p:cNvGrpSpPr/>
         <p:nvPr/>
       </p:nvGrpSpPr>
@@ -1107,7 +1108,7 @@
       </p:grpSpPr>
       <p:sp>
         <p:nvSpPr>
-          <p:cNvPr id="92" name="Google Shape;92;g22c5ea40572_0_65:notes"/>
+          <p:cNvPr id="78" name="Google Shape;78;g22c5ea40572_0_0:notes"/>
           <p:cNvSpPr/>
           <p:nvPr>
             <p:ph idx="2" type="sldImg"/>
@@ -1142,7 +1143,7 @@
       </p:sp>
       <p:sp>
         <p:nvSpPr>
-          <p:cNvPr id="93" name="Google Shape;93;g22c5ea40572_0_65:notes"/>
+          <p:cNvPr id="79" name="Google Shape;79;g22c5ea40572_0_0:notes"/>
           <p:cNvSpPr txBox="1"/>
           <p:nvPr>
             <p:ph idx="1" type="body"/>
@@ -1192,7 +1193,7 @@
   <p:cSld>
     <p:spTree>
       <p:nvGrpSpPr>
-        <p:cNvPr id="106" name="Shape 106"/>
+        <p:cNvPr id="100" name="Shape 100"/>
         <p:cNvGrpSpPr/>
         <p:nvPr/>
       </p:nvGrpSpPr>
@@ -1206,7 +1207,7 @@
       </p:grpSpPr>
       <p:sp>
         <p:nvSpPr>
-          <p:cNvPr id="107" name="Google Shape;107;g22c5ea40572_0_69:notes"/>
+          <p:cNvPr id="101" name="Google Shape;101;g22c5ea40572_0_65:notes"/>
           <p:cNvSpPr/>
           <p:nvPr>
             <p:ph idx="2" type="sldImg"/>
@@ -1241,7 +1242,106 @@
       </p:sp>
       <p:sp>
         <p:nvSpPr>
-          <p:cNvPr id="108" name="Google Shape;108;g22c5ea40572_0_69:notes"/>
+          <p:cNvPr id="102" name="Google Shape;102;g22c5ea40572_0_65:notes"/>
+          <p:cNvSpPr txBox="1"/>
+          <p:nvPr>
+            <p:ph idx="1" type="body"/>
+          </p:nvPr>
+        </p:nvSpPr>
+        <p:spPr>
+          <a:xfrm>
+            <a:off x="685800" y="4343400"/>
+            <a:ext cx="5486400" cy="4114800"/>
+          </a:xfrm>
+          <a:prstGeom prst="rect">
+            <a:avLst/>
+          </a:prstGeom>
+        </p:spPr>
+        <p:txBody>
+          <a:bodyPr anchorCtr="0" anchor="t" bIns="91425" lIns="91425" spcFirstLastPara="1" rIns="91425" wrap="square" tIns="91425">
+            <a:noAutofit/>
+          </a:bodyPr>
+          <a:lstStyle/>
+          <a:p>
+            <a:pPr indent="0" lvl="0" marL="0" rtl="0" algn="l">
+              <a:spcBef>
+                <a:spcPts val="0"/>
+              </a:spcBef>
+              <a:spcAft>
+                <a:spcPts val="0"/>
+              </a:spcAft>
+              <a:buNone/>
+            </a:pPr>
+            <a:r>
+              <a:t/>
+            </a:r>
+            <a:endParaRPr/>
+          </a:p>
+        </p:txBody>
+      </p:sp>
+    </p:spTree>
+  </p:cSld>
+  <p:clrMapOvr>
+    <a:masterClrMapping/>
+  </p:clrMapOvr>
+</p:notes>
+</file>
+
+<file path=ppt/notesSlides/notesSlide6.xml><?xml version="1.0" encoding="utf-8"?>
+<p:notes xmlns:a="http://schemas.openxmlformats.org/drawingml/2006/main" xmlns:r="http://schemas.openxmlformats.org/officeDocument/2006/relationships" xmlns:mc="http://schemas.openxmlformats.org/markup-compatibility/2006" xmlns:mv="urn:schemas-microsoft-com:mac:vml" xmlns:p="http://schemas.openxmlformats.org/presentationml/2006/main" xmlns:c="http://schemas.openxmlformats.org/drawingml/2006/chart" xmlns:dgm="http://schemas.openxmlformats.org/drawingml/2006/diagram" xmlns:o="urn:schemas-microsoft-com:office:office" xmlns:v="urn:schemas-microsoft-com:vml" xmlns:pvml="urn:schemas-microsoft-com:office:powerpoint" xmlns:com="http://schemas.openxmlformats.org/drawingml/2006/compatibility" xmlns:p14="http://schemas.microsoft.com/office/powerpoint/2010/main" xmlns:p15="http://schemas.microsoft.com/office/powerpoint/2012/main" xmlns:ahyp="http://schemas.microsoft.com/office/drawing/2018/hyperlinkcolor" showMasterPhAnim="0" showMasterSp="0">
+  <p:cSld>
+    <p:spTree>
+      <p:nvGrpSpPr>
+        <p:cNvPr id="115" name="Shape 115"/>
+        <p:cNvGrpSpPr/>
+        <p:nvPr/>
+      </p:nvGrpSpPr>
+      <p:grpSpPr>
+        <a:xfrm>
+          <a:off x="0" y="0"/>
+          <a:ext cx="0" cy="0"/>
+          <a:chOff x="0" y="0"/>
+          <a:chExt cx="0" cy="0"/>
+        </a:xfrm>
+      </p:grpSpPr>
+      <p:sp>
+        <p:nvSpPr>
+          <p:cNvPr id="116" name="Google Shape;116;g22c5ea40572_0_69:notes"/>
+          <p:cNvSpPr/>
+          <p:nvPr>
+            <p:ph idx="2" type="sldImg"/>
+          </p:nvPr>
+        </p:nvSpPr>
+        <p:spPr>
+          <a:xfrm>
+            <a:off x="381300" y="685800"/>
+            <a:ext cx="6096000" cy="3429000"/>
+          </a:xfrm>
+          <a:custGeom>
+            <a:rect b="b" l="l" r="r" t="t"/>
+            <a:pathLst>
+              <a:path extrusionOk="0" h="120000" w="120000">
+                <a:moveTo>
+                  <a:pt x="0" y="0"/>
+                </a:moveTo>
+                <a:lnTo>
+                  <a:pt x="120000" y="0"/>
+                </a:lnTo>
+                <a:lnTo>
+                  <a:pt x="120000" y="120000"/>
+                </a:lnTo>
+                <a:lnTo>
+                  <a:pt x="0" y="120000"/>
+                </a:lnTo>
+                <a:close/>
+              </a:path>
+            </a:pathLst>
+          </a:custGeom>
+        </p:spPr>
+      </p:sp>
+      <p:sp>
+        <p:nvSpPr>
+          <p:cNvPr id="117" name="Google Shape;117;g22c5ea40572_0_69:notes"/>
           <p:cNvSpPr txBox="1"/>
           <p:nvPr>
             <p:ph idx="1" type="body"/>
@@ -5941,7 +6041,7 @@
     <p:bg>
       <p:bgPr>
         <a:solidFill>
-          <a:srgbClr val="F3F3F3"/>
+          <a:srgbClr val="EFEFEF"/>
         </a:solidFill>
       </p:bgPr>
     </p:bg>
@@ -6281,7 +6381,7 @@
                 <a:cs typeface="Roboto"/>
                 <a:sym typeface="Roboto"/>
               </a:rPr>
-              <a:t>Unsere Aufgabe</a:t>
+              <a:t>Das Team</a:t>
             </a:r>
             <a:endParaRPr>
               <a:latin typeface="Roboto"/>
@@ -6383,6 +6483,424 @@
           </a:bodyPr>
           <a:lstStyle/>
           <a:p>
+            <a:pPr indent="-342900" lvl="0" marL="457200" rtl="0" algn="l">
+              <a:spcBef>
+                <a:spcPts val="0"/>
+              </a:spcBef>
+              <a:spcAft>
+                <a:spcPts val="0"/>
+              </a:spcAft>
+              <a:buSzPts val="1800"/>
+              <a:buFont typeface="Roboto"/>
+              <a:buChar char="●"/>
+            </a:pPr>
+            <a:r>
+              <a:rPr lang="de">
+                <a:latin typeface="Roboto"/>
+                <a:ea typeface="Roboto"/>
+                <a:cs typeface="Roboto"/>
+                <a:sym typeface="Roboto"/>
+              </a:rPr>
+              <a:t>Mike Menzel (Scrum Master, Qualität*)</a:t>
+            </a:r>
+            <a:endParaRPr>
+              <a:latin typeface="Roboto"/>
+              <a:ea typeface="Roboto"/>
+              <a:cs typeface="Roboto"/>
+              <a:sym typeface="Roboto"/>
+            </a:endParaRPr>
+          </a:p>
+          <a:p>
+            <a:pPr indent="-342900" lvl="0" marL="457200" marR="0" rtl="0" algn="l">
+              <a:lnSpc>
+                <a:spcPct val="115000"/>
+              </a:lnSpc>
+              <a:spcBef>
+                <a:spcPts val="0"/>
+              </a:spcBef>
+              <a:spcAft>
+                <a:spcPts val="0"/>
+              </a:spcAft>
+              <a:buSzPts val="1800"/>
+              <a:buFont typeface="Roboto"/>
+              <a:buChar char="●"/>
+            </a:pPr>
+            <a:r>
+              <a:rPr lang="de">
+                <a:latin typeface="Roboto"/>
+                <a:ea typeface="Roboto"/>
+                <a:cs typeface="Roboto"/>
+                <a:sym typeface="Roboto"/>
+              </a:rPr>
+              <a:t>Andreas Roth (Risikomanagement, Scrum Master*, Website*)</a:t>
+            </a:r>
+            <a:endParaRPr>
+              <a:latin typeface="Roboto"/>
+              <a:ea typeface="Roboto"/>
+              <a:cs typeface="Roboto"/>
+              <a:sym typeface="Roboto"/>
+            </a:endParaRPr>
+          </a:p>
+          <a:p>
+            <a:pPr indent="-342900" lvl="0" marL="457200" marR="0" rtl="0" algn="l">
+              <a:lnSpc>
+                <a:spcPct val="115000"/>
+              </a:lnSpc>
+              <a:spcBef>
+                <a:spcPts val="0"/>
+              </a:spcBef>
+              <a:spcAft>
+                <a:spcPts val="0"/>
+              </a:spcAft>
+              <a:buSzPts val="1800"/>
+              <a:buFont typeface="Roboto"/>
+              <a:buChar char="●"/>
+            </a:pPr>
+            <a:r>
+              <a:rPr lang="de">
+                <a:latin typeface="Roboto"/>
+                <a:ea typeface="Roboto"/>
+                <a:cs typeface="Roboto"/>
+                <a:sym typeface="Roboto"/>
+              </a:rPr>
+              <a:t>Fabian Hoppe (Product Owner,  Kalender, Tools*)</a:t>
+            </a:r>
+            <a:endParaRPr>
+              <a:latin typeface="Roboto"/>
+              <a:ea typeface="Roboto"/>
+              <a:cs typeface="Roboto"/>
+              <a:sym typeface="Roboto"/>
+            </a:endParaRPr>
+          </a:p>
+          <a:p>
+            <a:pPr indent="-342900" lvl="0" marL="457200" marR="0" rtl="0" algn="l">
+              <a:lnSpc>
+                <a:spcPct val="115000"/>
+              </a:lnSpc>
+              <a:spcBef>
+                <a:spcPts val="0"/>
+              </a:spcBef>
+              <a:spcAft>
+                <a:spcPts val="0"/>
+              </a:spcAft>
+              <a:buSzPts val="1800"/>
+              <a:buFont typeface="Roboto"/>
+              <a:buChar char="●"/>
+            </a:pPr>
+            <a:r>
+              <a:rPr lang="de">
+                <a:latin typeface="Roboto"/>
+                <a:ea typeface="Roboto"/>
+                <a:cs typeface="Roboto"/>
+                <a:sym typeface="Roboto"/>
+              </a:rPr>
+              <a:t>Eren Saglam (Website, Product Owner*, Risikomanagement*)</a:t>
+            </a:r>
+            <a:endParaRPr>
+              <a:latin typeface="Roboto"/>
+              <a:ea typeface="Roboto"/>
+              <a:cs typeface="Roboto"/>
+              <a:sym typeface="Roboto"/>
+            </a:endParaRPr>
+          </a:p>
+          <a:p>
+            <a:pPr indent="-342900" lvl="0" marL="457200" marR="0" rtl="0" algn="l">
+              <a:lnSpc>
+                <a:spcPct val="115000"/>
+              </a:lnSpc>
+              <a:spcBef>
+                <a:spcPts val="0"/>
+              </a:spcBef>
+              <a:spcAft>
+                <a:spcPts val="0"/>
+              </a:spcAft>
+              <a:buSzPts val="1800"/>
+              <a:buFont typeface="Roboto"/>
+              <a:buChar char="●"/>
+            </a:pPr>
+            <a:r>
+              <a:rPr lang="de">
+                <a:latin typeface="Roboto"/>
+                <a:ea typeface="Roboto"/>
+                <a:cs typeface="Roboto"/>
+                <a:sym typeface="Roboto"/>
+              </a:rPr>
+              <a:t>Stephan Halder (Qualität)</a:t>
+            </a:r>
+            <a:endParaRPr>
+              <a:latin typeface="Roboto"/>
+              <a:ea typeface="Roboto"/>
+              <a:cs typeface="Roboto"/>
+              <a:sym typeface="Roboto"/>
+            </a:endParaRPr>
+          </a:p>
+          <a:p>
+            <a:pPr indent="-342900" lvl="0" marL="457200" marR="0" rtl="0" algn="l">
+              <a:lnSpc>
+                <a:spcPct val="115000"/>
+              </a:lnSpc>
+              <a:spcBef>
+                <a:spcPts val="0"/>
+              </a:spcBef>
+              <a:spcAft>
+                <a:spcPts val="0"/>
+              </a:spcAft>
+              <a:buSzPts val="1800"/>
+              <a:buFont typeface="Roboto"/>
+              <a:buChar char="●"/>
+            </a:pPr>
+            <a:r>
+              <a:rPr lang="de">
+                <a:latin typeface="Roboto"/>
+                <a:ea typeface="Roboto"/>
+                <a:cs typeface="Roboto"/>
+                <a:sym typeface="Roboto"/>
+              </a:rPr>
+              <a:t>Aleksandra Kun &amp; Bibiána Lazarová (Design)</a:t>
+            </a:r>
+            <a:endParaRPr>
+              <a:latin typeface="Roboto"/>
+              <a:ea typeface="Roboto"/>
+              <a:cs typeface="Roboto"/>
+              <a:sym typeface="Roboto"/>
+            </a:endParaRPr>
+          </a:p>
+        </p:txBody>
+      </p:sp>
+      <p:sp>
+        <p:nvSpPr>
+          <p:cNvPr id="68" name="Google Shape;68;p14"/>
+          <p:cNvSpPr txBox="1"/>
+          <p:nvPr/>
+        </p:nvSpPr>
+        <p:spPr>
+          <a:xfrm>
+            <a:off x="485250" y="4568875"/>
+            <a:ext cx="8173500" cy="461700"/>
+          </a:xfrm>
+          <a:prstGeom prst="rect">
+            <a:avLst/>
+          </a:prstGeom>
+          <a:noFill/>
+          <a:ln>
+            <a:noFill/>
+          </a:ln>
+        </p:spPr>
+        <p:txBody>
+          <a:bodyPr anchorCtr="0" anchor="t" bIns="91425" lIns="91425" spcFirstLastPara="1" rIns="91425" wrap="square" tIns="91425">
+            <a:spAutoFit/>
+          </a:bodyPr>
+          <a:lstStyle/>
+          <a:p>
+            <a:pPr indent="0" lvl="0" marL="0" marR="0" rtl="0" algn="l">
+              <a:lnSpc>
+                <a:spcPct val="115000"/>
+              </a:lnSpc>
+              <a:spcBef>
+                <a:spcPts val="0"/>
+              </a:spcBef>
+              <a:spcAft>
+                <a:spcPts val="1200"/>
+              </a:spcAft>
+              <a:buNone/>
+            </a:pPr>
+            <a:r>
+              <a:rPr lang="de"/>
+              <a:t>*</a:t>
+            </a:r>
+            <a:r>
+              <a:rPr lang="de"/>
+              <a:t> </a:t>
+            </a:r>
+            <a:r>
+              <a:rPr lang="de" sz="1800">
+                <a:solidFill>
+                  <a:schemeClr val="dk2"/>
+                </a:solidFill>
+                <a:latin typeface="Roboto"/>
+                <a:ea typeface="Roboto"/>
+                <a:cs typeface="Roboto"/>
+                <a:sym typeface="Roboto"/>
+              </a:rPr>
+              <a:t>stellvertretend</a:t>
+            </a:r>
+            <a:endParaRPr/>
+          </a:p>
+        </p:txBody>
+      </p:sp>
+    </p:spTree>
+  </p:cSld>
+  <p:clrMapOvr>
+    <a:masterClrMapping/>
+  </p:clrMapOvr>
+</p:sld>
+</file>
+
+<file path=ppt/slides/slide3.xml><?xml version="1.0" encoding="utf-8"?>
+<p:sld xmlns:a="http://schemas.openxmlformats.org/drawingml/2006/main" xmlns:r="http://schemas.openxmlformats.org/officeDocument/2006/relationships" xmlns:mc="http://schemas.openxmlformats.org/markup-compatibility/2006" xmlns:mv="urn:schemas-microsoft-com:mac:vml" xmlns:p="http://schemas.openxmlformats.org/presentationml/2006/main" xmlns:c="http://schemas.openxmlformats.org/drawingml/2006/chart" xmlns:dgm="http://schemas.openxmlformats.org/drawingml/2006/diagram" xmlns:o="urn:schemas-microsoft-com:office:office" xmlns:v="urn:schemas-microsoft-com:vml" xmlns:pvml="urn:schemas-microsoft-com:office:powerpoint" xmlns:com="http://schemas.openxmlformats.org/drawingml/2006/compatibility" xmlns:p14="http://schemas.microsoft.com/office/powerpoint/2010/main" xmlns:p15="http://schemas.microsoft.com/office/powerpoint/2012/main" xmlns:ahyp="http://schemas.microsoft.com/office/drawing/2018/hyperlinkcolor">
+  <p:cSld>
+    <p:bg>
+      <p:bgPr>
+        <a:solidFill>
+          <a:schemeClr val="lt2"/>
+        </a:solidFill>
+      </p:bgPr>
+    </p:bg>
+    <p:spTree>
+      <p:nvGrpSpPr>
+        <p:cNvPr id="72" name="Shape 72"/>
+        <p:cNvGrpSpPr/>
+        <p:nvPr/>
+      </p:nvGrpSpPr>
+      <p:grpSpPr>
+        <a:xfrm>
+          <a:off x="0" y="0"/>
+          <a:ext cx="0" cy="0"/>
+          <a:chOff x="0" y="0"/>
+          <a:chExt cx="0" cy="0"/>
+        </a:xfrm>
+      </p:grpSpPr>
+      <p:sp>
+        <p:nvSpPr>
+          <p:cNvPr id="73" name="Google Shape;73;p15"/>
+          <p:cNvSpPr txBox="1"/>
+          <p:nvPr>
+            <p:ph type="title"/>
+          </p:nvPr>
+        </p:nvSpPr>
+        <p:spPr>
+          <a:xfrm>
+            <a:off x="311700" y="445025"/>
+            <a:ext cx="8520600" cy="572700"/>
+          </a:xfrm>
+          <a:prstGeom prst="rect">
+            <a:avLst/>
+          </a:prstGeom>
+        </p:spPr>
+        <p:txBody>
+          <a:bodyPr anchorCtr="0" anchor="t" bIns="91425" lIns="91425" spcFirstLastPara="1" rIns="91425" wrap="square" tIns="91425">
+            <a:normAutofit fontScale="90000"/>
+          </a:bodyPr>
+          <a:lstStyle/>
+          <a:p>
+            <a:pPr indent="0" lvl="0" marL="0" rtl="0" algn="l">
+              <a:spcBef>
+                <a:spcPts val="0"/>
+              </a:spcBef>
+              <a:spcAft>
+                <a:spcPts val="0"/>
+              </a:spcAft>
+              <a:buNone/>
+            </a:pPr>
+            <a:r>
+              <a:rPr lang="de">
+                <a:latin typeface="Roboto"/>
+                <a:ea typeface="Roboto"/>
+                <a:cs typeface="Roboto"/>
+                <a:sym typeface="Roboto"/>
+              </a:rPr>
+              <a:t>Unsere Aufgabe</a:t>
+            </a:r>
+            <a:endParaRPr>
+              <a:latin typeface="Roboto"/>
+              <a:ea typeface="Roboto"/>
+              <a:cs typeface="Roboto"/>
+              <a:sym typeface="Roboto"/>
+            </a:endParaRPr>
+          </a:p>
+        </p:txBody>
+      </p:sp>
+      <p:sp>
+        <p:nvSpPr>
+          <p:cNvPr id="74" name="Google Shape;74;p15"/>
+          <p:cNvSpPr txBox="1"/>
+          <p:nvPr>
+            <p:ph idx="12" type="sldNum"/>
+          </p:nvPr>
+        </p:nvSpPr>
+        <p:spPr>
+          <a:xfrm>
+            <a:off x="8472458" y="4663217"/>
+            <a:ext cx="548700" cy="393600"/>
+          </a:xfrm>
+          <a:prstGeom prst="rect">
+            <a:avLst/>
+          </a:prstGeom>
+        </p:spPr>
+        <p:txBody>
+          <a:bodyPr anchorCtr="0" anchor="ctr" bIns="91425" lIns="91425" spcFirstLastPara="1" rIns="91425" wrap="square" tIns="91425">
+            <a:normAutofit/>
+          </a:bodyPr>
+          <a:lstStyle/>
+          <a:p>
+            <a:pPr indent="0" lvl="0" marL="0" rtl="0" algn="r">
+              <a:spcBef>
+                <a:spcPts val="0"/>
+              </a:spcBef>
+              <a:spcAft>
+                <a:spcPts val="0"/>
+              </a:spcAft>
+              <a:buNone/>
+            </a:pPr>
+            <a:fld id="{00000000-1234-1234-1234-123412341234}" type="slidenum">
+              <a:rPr lang="de"/>
+              <a:t>‹#›</a:t>
+            </a:fld>
+            <a:endParaRPr/>
+          </a:p>
+        </p:txBody>
+      </p:sp>
+      <p:pic>
+        <p:nvPicPr>
+          <p:cNvPr id="75" name="Google Shape;75;p15"/>
+          <p:cNvPicPr preferRelativeResize="0"/>
+          <p:nvPr/>
+        </p:nvPicPr>
+        <p:blipFill>
+          <a:blip r:embed="rId3">
+            <a:alphaModFix/>
+          </a:blip>
+          <a:stretch>
+            <a:fillRect/>
+          </a:stretch>
+        </p:blipFill>
+        <p:spPr>
+          <a:xfrm>
+            <a:off x="7745150" y="55200"/>
+            <a:ext cx="1276001" cy="1276001"/>
+          </a:xfrm>
+          <a:prstGeom prst="rect">
+            <a:avLst/>
+          </a:prstGeom>
+          <a:noFill/>
+          <a:ln>
+            <a:noFill/>
+          </a:ln>
+        </p:spPr>
+      </p:pic>
+      <p:sp>
+        <p:nvSpPr>
+          <p:cNvPr id="76" name="Google Shape;76;p15"/>
+          <p:cNvSpPr txBox="1"/>
+          <p:nvPr>
+            <p:ph idx="1" type="body"/>
+          </p:nvPr>
+        </p:nvSpPr>
+        <p:spPr>
+          <a:xfrm>
+            <a:off x="311700" y="1152475"/>
+            <a:ext cx="8520600" cy="3416400"/>
+          </a:xfrm>
+          <a:prstGeom prst="rect">
+            <a:avLst/>
+          </a:prstGeom>
+        </p:spPr>
+        <p:txBody>
+          <a:bodyPr anchorCtr="0" anchor="t" bIns="91425" lIns="91425" spcFirstLastPara="1" rIns="91425" wrap="square" tIns="91425">
+            <a:normAutofit/>
+          </a:bodyPr>
+          <a:lstStyle/>
+          <a:p>
             <a:pPr indent="0" lvl="0" marL="0" rtl="0" algn="l">
               <a:spcBef>
                 <a:spcPts val="0"/>
@@ -6418,7 +6936,7 @@
 </p:sld>
 </file>
 
-<file path=ppt/slides/slide3.xml><?xml version="1.0" encoding="utf-8"?>
+<file path=ppt/slides/slide4.xml><?xml version="1.0" encoding="utf-8"?>
 <p:sld xmlns:a="http://schemas.openxmlformats.org/drawingml/2006/main" xmlns:r="http://schemas.openxmlformats.org/officeDocument/2006/relationships" xmlns:mc="http://schemas.openxmlformats.org/markup-compatibility/2006" xmlns:mv="urn:schemas-microsoft-com:mac:vml" xmlns:p="http://schemas.openxmlformats.org/presentationml/2006/main" xmlns:c="http://schemas.openxmlformats.org/drawingml/2006/chart" xmlns:dgm="http://schemas.openxmlformats.org/drawingml/2006/diagram" xmlns:o="urn:schemas-microsoft-com:office:office" xmlns:v="urn:schemas-microsoft-com:vml" xmlns:pvml="urn:schemas-microsoft-com:office:powerpoint" xmlns:com="http://schemas.openxmlformats.org/drawingml/2006/compatibility" xmlns:p14="http://schemas.microsoft.com/office/powerpoint/2010/main" xmlns:p15="http://schemas.microsoft.com/office/powerpoint/2012/main" xmlns:ahyp="http://schemas.microsoft.com/office/drawing/2018/hyperlinkcolor">
   <p:cSld>
     <p:bg>
@@ -6430,7 +6948,7 @@
     </p:bg>
     <p:spTree>
       <p:nvGrpSpPr>
-        <p:cNvPr id="71" name="Shape 71"/>
+        <p:cNvPr id="80" name="Shape 80"/>
         <p:cNvGrpSpPr/>
         <p:nvPr/>
       </p:nvGrpSpPr>
@@ -6444,7 +6962,7 @@
       </p:grpSpPr>
       <p:sp>
         <p:nvSpPr>
-          <p:cNvPr id="72" name="Google Shape;72;p15"/>
+          <p:cNvPr id="81" name="Google Shape;81;p16"/>
           <p:cNvSpPr txBox="1"/>
           <p:nvPr>
             <p:ph type="title"/>
@@ -6481,7 +6999,7 @@
                 <a:cs typeface="Roboto"/>
                 <a:sym typeface="Roboto"/>
               </a:rPr>
-              <a:t>Meilensteine</a:t>
+              <a:t>Übersicht</a:t>
             </a:r>
             <a:endParaRPr>
               <a:latin typeface="Roboto"/>
@@ -6494,21 +7012,21 @@
       </p:sp>
       <p:grpSp>
         <p:nvGrpSpPr>
-          <p:cNvPr id="73" name="Google Shape;73;p15"/>
+          <p:cNvPr id="82" name="Google Shape;82;p16"/>
           <p:cNvGrpSpPr/>
           <p:nvPr/>
         </p:nvGrpSpPr>
         <p:grpSpPr>
           <a:xfrm>
-            <a:off x="311696" y="1483125"/>
-            <a:ext cx="4246717" cy="2177251"/>
+            <a:off x="122904" y="1483125"/>
+            <a:ext cx="4435367" cy="2177251"/>
             <a:chOff x="453300" y="1216889"/>
             <a:chExt cx="2770200" cy="1753161"/>
           </a:xfrm>
         </p:grpSpPr>
         <p:grpSp>
           <p:nvGrpSpPr>
-            <p:cNvPr id="74" name="Google Shape;74;p15"/>
+            <p:cNvPr id="83" name="Google Shape;83;p16"/>
             <p:cNvGrpSpPr/>
             <p:nvPr/>
           </p:nvGrpSpPr>
@@ -6522,7 +7040,7 @@
           </p:grpSpPr>
           <p:sp>
             <p:nvSpPr>
-              <p:cNvPr id="75" name="Google Shape;75;p15"/>
+              <p:cNvPr id="84" name="Google Shape;84;p16"/>
               <p:cNvSpPr txBox="1"/>
               <p:nvPr/>
             </p:nvSpPr>
@@ -6574,7 +7092,7 @@
           </p:sp>
           <p:sp>
             <p:nvSpPr>
-              <p:cNvPr id="76" name="Google Shape;76;p15"/>
+              <p:cNvPr id="85" name="Google Shape;85;p16"/>
               <p:cNvSpPr txBox="1"/>
               <p:nvPr/>
             </p:nvSpPr>
@@ -6627,7 +7145,7 @@
         </p:grpSp>
         <p:grpSp>
           <p:nvGrpSpPr>
-            <p:cNvPr id="77" name="Google Shape;77;p15"/>
+            <p:cNvPr id="86" name="Google Shape;86;p16"/>
             <p:cNvGrpSpPr/>
             <p:nvPr/>
           </p:nvGrpSpPr>
@@ -6641,7 +7159,7 @@
           </p:grpSpPr>
           <p:sp>
             <p:nvSpPr>
-              <p:cNvPr id="78" name="Google Shape;78;p15"/>
+              <p:cNvPr id="87" name="Google Shape;87;p16"/>
               <p:cNvSpPr txBox="1"/>
               <p:nvPr/>
             </p:nvSpPr>
@@ -6693,7 +7211,7 @@
           </p:sp>
           <p:cxnSp>
             <p:nvCxnSpPr>
-              <p:cNvPr id="79" name="Google Shape;79;p15"/>
+              <p:cNvPr id="88" name="Google Shape;88;p16"/>
               <p:cNvCxnSpPr/>
               <p:nvPr/>
             </p:nvCxnSpPr>
@@ -6719,7 +7237,7 @@
           </p:cxnSp>
           <p:sp>
             <p:nvSpPr>
-              <p:cNvPr id="80" name="Google Shape;80;p15"/>
+              <p:cNvPr id="89" name="Google Shape;89;p16"/>
               <p:cNvSpPr/>
               <p:nvPr/>
             </p:nvSpPr>
@@ -6781,7 +7299,7 @@
       </p:grpSp>
       <p:grpSp>
         <p:nvGrpSpPr>
-          <p:cNvPr id="81" name="Google Shape;81;p15"/>
+          <p:cNvPr id="90" name="Google Shape;90;p16"/>
           <p:cNvGrpSpPr/>
           <p:nvPr/>
         </p:nvGrpSpPr>
@@ -6795,7 +7313,7 @@
         </p:grpSpPr>
         <p:grpSp>
           <p:nvGrpSpPr>
-            <p:cNvPr id="82" name="Google Shape;82;p15"/>
+            <p:cNvPr id="91" name="Google Shape;91;p16"/>
             <p:cNvGrpSpPr/>
             <p:nvPr/>
           </p:nvGrpSpPr>
@@ -6809,7 +7327,7 @@
           </p:grpSpPr>
           <p:sp>
             <p:nvSpPr>
-              <p:cNvPr id="83" name="Google Shape;83;p15"/>
+              <p:cNvPr id="92" name="Google Shape;92;p16"/>
               <p:cNvSpPr txBox="1"/>
               <p:nvPr/>
             </p:nvSpPr>
@@ -6861,7 +7379,7 @@
           </p:sp>
           <p:sp>
             <p:nvSpPr>
-              <p:cNvPr id="84" name="Google Shape;84;p15"/>
+              <p:cNvPr id="93" name="Google Shape;93;p16"/>
               <p:cNvSpPr txBox="1"/>
               <p:nvPr/>
             </p:nvSpPr>
@@ -6914,7 +7432,7 @@
         </p:grpSp>
         <p:grpSp>
           <p:nvGrpSpPr>
-            <p:cNvPr id="85" name="Google Shape;85;p15"/>
+            <p:cNvPr id="94" name="Google Shape;94;p16"/>
             <p:cNvGrpSpPr/>
             <p:nvPr/>
           </p:nvGrpSpPr>
@@ -6928,7 +7446,7 @@
           </p:grpSpPr>
           <p:sp>
             <p:nvSpPr>
-              <p:cNvPr id="86" name="Google Shape;86;p15"/>
+              <p:cNvPr id="95" name="Google Shape;95;p16"/>
               <p:cNvSpPr txBox="1"/>
               <p:nvPr/>
             </p:nvSpPr>
@@ -6980,7 +7498,7 @@
           </p:sp>
           <p:cxnSp>
             <p:nvCxnSpPr>
-              <p:cNvPr id="87" name="Google Shape;87;p15"/>
+              <p:cNvPr id="96" name="Google Shape;96;p16"/>
               <p:cNvCxnSpPr/>
               <p:nvPr/>
             </p:nvCxnSpPr>
@@ -7006,7 +7524,7 @@
           </p:cxnSp>
           <p:sp>
             <p:nvSpPr>
-              <p:cNvPr id="88" name="Google Shape;88;p15"/>
+              <p:cNvPr id="97" name="Google Shape;97;p16"/>
               <p:cNvSpPr/>
               <p:nvPr/>
             </p:nvSpPr>
@@ -7068,7 +7586,7 @@
       </p:grpSp>
       <p:sp>
         <p:nvSpPr>
-          <p:cNvPr id="89" name="Google Shape;89;p15"/>
+          <p:cNvPr id="98" name="Google Shape;98;p16"/>
           <p:cNvSpPr txBox="1"/>
           <p:nvPr>
             <p:ph idx="12" type="sldNum"/>
@@ -7108,7 +7626,7 @@
       </p:sp>
       <p:pic>
         <p:nvPicPr>
-          <p:cNvPr id="90" name="Google Shape;90;p15"/>
+          <p:cNvPr id="99" name="Google Shape;99;p16"/>
           <p:cNvPicPr preferRelativeResize="0"/>
           <p:nvPr/>
         </p:nvPicPr>
@@ -7142,7 +7660,7 @@
 </p:sld>
 </file>
 
-<file path=ppt/slides/slide4.xml><?xml version="1.0" encoding="utf-8"?>
+<file path=ppt/slides/slide5.xml><?xml version="1.0" encoding="utf-8"?>
 <p:sld xmlns:a="http://schemas.openxmlformats.org/drawingml/2006/main" xmlns:r="http://schemas.openxmlformats.org/officeDocument/2006/relationships" xmlns:mc="http://schemas.openxmlformats.org/markup-compatibility/2006" xmlns:mv="urn:schemas-microsoft-com:mac:vml" xmlns:p="http://schemas.openxmlformats.org/presentationml/2006/main" xmlns:c="http://schemas.openxmlformats.org/drawingml/2006/chart" xmlns:dgm="http://schemas.openxmlformats.org/drawingml/2006/diagram" xmlns:o="urn:schemas-microsoft-com:office:office" xmlns:v="urn:schemas-microsoft-com:vml" xmlns:pvml="urn:schemas-microsoft-com:office:powerpoint" xmlns:com="http://schemas.openxmlformats.org/drawingml/2006/compatibility" xmlns:p14="http://schemas.microsoft.com/office/powerpoint/2010/main" xmlns:p15="http://schemas.microsoft.com/office/powerpoint/2012/main" xmlns:ahyp="http://schemas.microsoft.com/office/drawing/2018/hyperlinkcolor">
   <p:cSld>
     <p:bg>
@@ -7154,7 +7672,7 @@
     </p:bg>
     <p:spTree>
       <p:nvGrpSpPr>
-        <p:cNvPr id="94" name="Shape 94"/>
+        <p:cNvPr id="103" name="Shape 103"/>
         <p:cNvGrpSpPr/>
         <p:nvPr/>
       </p:nvGrpSpPr>
@@ -7168,7 +7686,7 @@
       </p:grpSpPr>
       <p:sp>
         <p:nvSpPr>
-          <p:cNvPr id="95" name="Google Shape;95;p16"/>
+          <p:cNvPr id="104" name="Google Shape;104;p17"/>
           <p:cNvSpPr txBox="1"/>
           <p:nvPr>
             <p:ph type="title"/>
@@ -7218,7 +7736,7 @@
       </p:sp>
       <p:sp>
         <p:nvSpPr>
-          <p:cNvPr id="96" name="Google Shape;96;p16"/>
+          <p:cNvPr id="105" name="Google Shape;105;p17"/>
           <p:cNvSpPr txBox="1"/>
           <p:nvPr>
             <p:ph idx="12" type="sldNum"/>
@@ -7258,7 +7776,7 @@
       </p:sp>
       <p:pic>
         <p:nvPicPr>
-          <p:cNvPr id="97" name="Google Shape;97;p16"/>
+          <p:cNvPr id="106" name="Google Shape;106;p17"/>
           <p:cNvPicPr preferRelativeResize="0"/>
           <p:nvPr/>
         </p:nvPicPr>
@@ -7286,7 +7804,7 @@
       </p:pic>
       <p:grpSp>
         <p:nvGrpSpPr>
-          <p:cNvPr id="98" name="Google Shape;98;p16"/>
+          <p:cNvPr id="107" name="Google Shape;107;p17"/>
           <p:cNvGrpSpPr/>
           <p:nvPr/>
         </p:nvGrpSpPr>
@@ -7300,7 +7818,7 @@
         </p:grpSpPr>
         <p:sp>
           <p:nvSpPr>
-            <p:cNvPr id="99" name="Google Shape;99;p16"/>
+            <p:cNvPr id="108" name="Google Shape;108;p17"/>
             <p:cNvSpPr/>
             <p:nvPr/>
           </p:nvSpPr>
@@ -7349,7 +7867,7 @@
         </p:sp>
         <p:sp>
           <p:nvSpPr>
-            <p:cNvPr id="100" name="Google Shape;100;p16"/>
+            <p:cNvPr id="109" name="Google Shape;109;p17"/>
             <p:cNvSpPr/>
             <p:nvPr/>
           </p:nvSpPr>
@@ -7398,7 +7916,7 @@
         </p:sp>
         <p:sp>
           <p:nvSpPr>
-            <p:cNvPr id="101" name="Google Shape;101;p16"/>
+            <p:cNvPr id="110" name="Google Shape;110;p17"/>
             <p:cNvSpPr/>
             <p:nvPr/>
           </p:nvSpPr>
@@ -7445,7 +7963,7 @@
         </p:sp>
         <p:sp>
           <p:nvSpPr>
-            <p:cNvPr id="102" name="Google Shape;102;p16"/>
+            <p:cNvPr id="111" name="Google Shape;111;p17"/>
             <p:cNvSpPr/>
             <p:nvPr/>
           </p:nvSpPr>
@@ -7494,7 +8012,7 @@
         </p:sp>
         <p:sp>
           <p:nvSpPr>
-            <p:cNvPr id="103" name="Google Shape;103;p16"/>
+            <p:cNvPr id="112" name="Google Shape;112;p17"/>
             <p:cNvSpPr/>
             <p:nvPr/>
           </p:nvSpPr>
@@ -7544,7 +8062,7 @@
       </p:grpSp>
       <p:pic>
         <p:nvPicPr>
-          <p:cNvPr id="104" name="Google Shape;104;p16"/>
+          <p:cNvPr id="113" name="Google Shape;113;p17"/>
           <p:cNvPicPr preferRelativeResize="0"/>
           <p:nvPr/>
         </p:nvPicPr>
@@ -7572,7 +8090,7 @@
       </p:pic>
       <p:sp>
         <p:nvSpPr>
-          <p:cNvPr id="105" name="Google Shape;105;p16"/>
+          <p:cNvPr id="114" name="Google Shape;114;p17"/>
           <p:cNvSpPr txBox="1"/>
           <p:nvPr/>
         </p:nvSpPr>
@@ -7630,7 +8148,7 @@
 </p:sld>
 </file>
 
-<file path=ppt/slides/slide5.xml><?xml version="1.0" encoding="utf-8"?>
+<file path=ppt/slides/slide6.xml><?xml version="1.0" encoding="utf-8"?>
 <p:sld xmlns:a="http://schemas.openxmlformats.org/drawingml/2006/main" xmlns:r="http://schemas.openxmlformats.org/officeDocument/2006/relationships" xmlns:mc="http://schemas.openxmlformats.org/markup-compatibility/2006" xmlns:mv="urn:schemas-microsoft-com:mac:vml" xmlns:p="http://schemas.openxmlformats.org/presentationml/2006/main" xmlns:c="http://schemas.openxmlformats.org/drawingml/2006/chart" xmlns:dgm="http://schemas.openxmlformats.org/drawingml/2006/diagram" xmlns:o="urn:schemas-microsoft-com:office:office" xmlns:v="urn:schemas-microsoft-com:vml" xmlns:pvml="urn:schemas-microsoft-com:office:powerpoint" xmlns:com="http://schemas.openxmlformats.org/drawingml/2006/compatibility" xmlns:p14="http://schemas.microsoft.com/office/powerpoint/2010/main" xmlns:p15="http://schemas.microsoft.com/office/powerpoint/2012/main" xmlns:ahyp="http://schemas.microsoft.com/office/drawing/2018/hyperlinkcolor">
   <p:cSld>
     <p:bg>
@@ -7642,7 +8160,7 @@
     </p:bg>
     <p:spTree>
       <p:nvGrpSpPr>
-        <p:cNvPr id="109" name="Shape 109"/>
+        <p:cNvPr id="118" name="Shape 118"/>
         <p:cNvGrpSpPr/>
         <p:nvPr/>
       </p:nvGrpSpPr>
@@ -7656,7 +8174,7 @@
       </p:grpSpPr>
       <p:sp>
         <p:nvSpPr>
-          <p:cNvPr id="110" name="Google Shape;110;p17"/>
+          <p:cNvPr id="119" name="Google Shape;119;p18"/>
           <p:cNvSpPr txBox="1"/>
           <p:nvPr>
             <p:ph type="title"/>
@@ -7712,7 +8230,7 @@
       </p:sp>
       <p:sp>
         <p:nvSpPr>
-          <p:cNvPr id="111" name="Google Shape;111;p17"/>
+          <p:cNvPr id="120" name="Google Shape;120;p18"/>
           <p:cNvSpPr txBox="1"/>
           <p:nvPr>
             <p:ph idx="12" type="sldNum"/>
@@ -7752,7 +8270,7 @@
       </p:sp>
       <p:pic>
         <p:nvPicPr>
-          <p:cNvPr id="112" name="Google Shape;112;p17"/>
+          <p:cNvPr id="121" name="Google Shape;121;p18"/>
           <p:cNvPicPr preferRelativeResize="0"/>
           <p:nvPr/>
         </p:nvPicPr>

</xml_diff>